<commit_message>
Add package type slide
</commit_message>
<xml_diff>
--- a/Hello World/Go Packages.pptx
+++ b/Hello World/Go Packages.pptx
@@ -7,6 +7,7 @@
   <p:sldIdLst>
     <p:sldId id="256" r:id="rId2"/>
     <p:sldId id="257" r:id="rId3"/>
+    <p:sldId id="258" r:id="rId4"/>
   </p:sldIdLst>
   <p:sldSz cx="12192000" cy="6858000"/>
   <p:notesSz cx="6858000" cy="9144000"/>
@@ -4085,10 +4086,302 @@
           </a:p>
         </p:txBody>
       </p:sp>
+      <p:pic>
+        <p:nvPicPr>
+          <p:cNvPr id="19" name="Picture 18">
+            <a:extLst>
+              <a:ext uri="{FF2B5EF4-FFF2-40B4-BE49-F238E27FC236}">
+                <a16:creationId xmlns:a16="http://schemas.microsoft.com/office/drawing/2014/main" id="{A4117614-EA09-4A6B-A38C-412F97733F05}"/>
+              </a:ext>
+            </a:extLst>
+          </p:cNvPr>
+          <p:cNvPicPr>
+            <a:picLocks noChangeAspect="1"/>
+          </p:cNvPicPr>
+          <p:nvPr/>
+        </p:nvPicPr>
+        <p:blipFill>
+          <a:blip r:embed="rId2"/>
+          <a:stretch>
+            <a:fillRect/>
+          </a:stretch>
+        </p:blipFill>
+        <p:spPr>
+          <a:xfrm>
+            <a:off x="9431646" y="2425227"/>
+            <a:ext cx="2286000" cy="2286000"/>
+          </a:xfrm>
+          <a:prstGeom prst="rect">
+            <a:avLst/>
+          </a:prstGeom>
+        </p:spPr>
+      </p:pic>
     </p:spTree>
     <p:extLst>
       <p:ext uri="{BB962C8B-B14F-4D97-AF65-F5344CB8AC3E}">
         <p14:creationId xmlns:p14="http://schemas.microsoft.com/office/powerpoint/2010/main" val="2607643518"/>
+      </p:ext>
+    </p:extLst>
+  </p:cSld>
+  <p:clrMapOvr>
+    <a:masterClrMapping/>
+  </p:clrMapOvr>
+</p:sld>
+</file>
+
+<file path=ppt/slides/slide3.xml><?xml version="1.0" encoding="utf-8"?>
+<p:sld xmlns:a="http://schemas.openxmlformats.org/drawingml/2006/main" xmlns:r="http://schemas.openxmlformats.org/officeDocument/2006/relationships" xmlns:p="http://schemas.openxmlformats.org/presentationml/2006/main">
+  <p:cSld>
+    <p:spTree>
+      <p:nvGrpSpPr>
+        <p:cNvPr id="1" name=""/>
+        <p:cNvGrpSpPr/>
+        <p:nvPr/>
+      </p:nvGrpSpPr>
+      <p:grpSpPr>
+        <a:xfrm>
+          <a:off x="0" y="0"/>
+          <a:ext cx="0" cy="0"/>
+          <a:chOff x="0" y="0"/>
+          <a:chExt cx="0" cy="0"/>
+        </a:xfrm>
+      </p:grpSpPr>
+      <p:sp>
+        <p:nvSpPr>
+          <p:cNvPr id="2" name="Title 1">
+            <a:extLst>
+              <a:ext uri="{FF2B5EF4-FFF2-40B4-BE49-F238E27FC236}">
+                <a16:creationId xmlns:a16="http://schemas.microsoft.com/office/drawing/2014/main" id="{707533C5-0694-4CFA-82B5-333E6AD3560B}"/>
+              </a:ext>
+            </a:extLst>
+          </p:cNvPr>
+          <p:cNvSpPr>
+            <a:spLocks noGrp="1"/>
+          </p:cNvSpPr>
+          <p:nvPr>
+            <p:ph type="title"/>
+          </p:nvPr>
+        </p:nvSpPr>
+        <p:spPr>
+          <a:xfrm>
+            <a:off x="252919" y="565037"/>
+            <a:ext cx="2947482" cy="4601183"/>
+          </a:xfrm>
+        </p:spPr>
+        <p:txBody>
+          <a:bodyPr/>
+          <a:lstStyle/>
+          <a:p>
+            <a:r>
+              <a:rPr lang="en-US" dirty="0"/>
+              <a:t>Two types of packages</a:t>
+            </a:r>
+          </a:p>
+        </p:txBody>
+      </p:sp>
+      <p:pic>
+        <p:nvPicPr>
+          <p:cNvPr id="6" name="Content Placeholder 5">
+            <a:extLst>
+              <a:ext uri="{FF2B5EF4-FFF2-40B4-BE49-F238E27FC236}">
+                <a16:creationId xmlns:a16="http://schemas.microsoft.com/office/drawing/2014/main" id="{C651DE65-9205-44F8-8BBA-89FCCF3A424B}"/>
+              </a:ext>
+            </a:extLst>
+          </p:cNvPr>
+          <p:cNvPicPr>
+            <a:picLocks noGrp="1" noChangeAspect="1"/>
+          </p:cNvPicPr>
+          <p:nvPr>
+            <p:ph idx="1"/>
+          </p:nvPr>
+        </p:nvPicPr>
+        <p:blipFill>
+          <a:blip r:embed="rId2"/>
+          <a:stretch>
+            <a:fillRect/>
+          </a:stretch>
+        </p:blipFill>
+        <p:spPr>
+          <a:xfrm>
+            <a:off x="914401" y="3448163"/>
+            <a:ext cx="2286000" cy="2286000"/>
+          </a:xfrm>
+        </p:spPr>
+      </p:pic>
+      <p:sp>
+        <p:nvSpPr>
+          <p:cNvPr id="7" name="Rectangle 6">
+            <a:extLst>
+              <a:ext uri="{FF2B5EF4-FFF2-40B4-BE49-F238E27FC236}">
+                <a16:creationId xmlns:a16="http://schemas.microsoft.com/office/drawing/2014/main" id="{CE9A12E4-C7EC-43EB-94D5-7D7EBD959E62}"/>
+              </a:ext>
+            </a:extLst>
+          </p:cNvPr>
+          <p:cNvSpPr/>
+          <p:nvPr/>
+        </p:nvSpPr>
+        <p:spPr>
+          <a:xfrm>
+            <a:off x="4715934" y="1149812"/>
+            <a:ext cx="2286000" cy="499534"/>
+          </a:xfrm>
+          <a:prstGeom prst="rect">
+            <a:avLst/>
+          </a:prstGeom>
+        </p:spPr>
+        <p:style>
+          <a:lnRef idx="2">
+            <a:schemeClr val="accent1">
+              <a:shade val="50000"/>
+            </a:schemeClr>
+          </a:lnRef>
+          <a:fillRef idx="1">
+            <a:schemeClr val="accent1"/>
+          </a:fillRef>
+          <a:effectRef idx="0">
+            <a:schemeClr val="accent1"/>
+          </a:effectRef>
+          <a:fontRef idx="minor">
+            <a:schemeClr val="lt1"/>
+          </a:fontRef>
+        </p:style>
+        <p:txBody>
+          <a:bodyPr rtlCol="0" anchor="ctr"/>
+          <a:lstStyle/>
+          <a:p>
+            <a:pPr algn="ctr"/>
+            <a:r>
+              <a:rPr lang="en-US" dirty="0"/>
+              <a:t>Executable</a:t>
+            </a:r>
+          </a:p>
+        </p:txBody>
+      </p:sp>
+      <p:sp>
+        <p:nvSpPr>
+          <p:cNvPr id="8" name="Rectangle 7">
+            <a:extLst>
+              <a:ext uri="{FF2B5EF4-FFF2-40B4-BE49-F238E27FC236}">
+                <a16:creationId xmlns:a16="http://schemas.microsoft.com/office/drawing/2014/main" id="{923220F1-594E-444D-A8BC-297FB76EE4BE}"/>
+              </a:ext>
+            </a:extLst>
+          </p:cNvPr>
+          <p:cNvSpPr/>
+          <p:nvPr/>
+        </p:nvSpPr>
+        <p:spPr>
+          <a:xfrm>
+            <a:off x="8314266" y="1149812"/>
+            <a:ext cx="2286000" cy="499534"/>
+          </a:xfrm>
+          <a:prstGeom prst="rect">
+            <a:avLst/>
+          </a:prstGeom>
+        </p:spPr>
+        <p:style>
+          <a:lnRef idx="2">
+            <a:schemeClr val="accent1">
+              <a:shade val="50000"/>
+            </a:schemeClr>
+          </a:lnRef>
+          <a:fillRef idx="1">
+            <a:schemeClr val="accent1"/>
+          </a:fillRef>
+          <a:effectRef idx="0">
+            <a:schemeClr val="accent1"/>
+          </a:effectRef>
+          <a:fontRef idx="minor">
+            <a:schemeClr val="lt1"/>
+          </a:fontRef>
+        </p:style>
+        <p:txBody>
+          <a:bodyPr rtlCol="0" anchor="ctr"/>
+          <a:lstStyle/>
+          <a:p>
+            <a:pPr algn="ctr"/>
+            <a:r>
+              <a:rPr lang="en-US" dirty="0"/>
+              <a:t>Reusable</a:t>
+            </a:r>
+          </a:p>
+        </p:txBody>
+      </p:sp>
+      <p:sp>
+        <p:nvSpPr>
+          <p:cNvPr id="9" name="TextBox 8">
+            <a:extLst>
+              <a:ext uri="{FF2B5EF4-FFF2-40B4-BE49-F238E27FC236}">
+                <a16:creationId xmlns:a16="http://schemas.microsoft.com/office/drawing/2014/main" id="{9E992A38-2254-4EDF-ADFD-58BCD1086897}"/>
+              </a:ext>
+            </a:extLst>
+          </p:cNvPr>
+          <p:cNvSpPr txBox="1"/>
+          <p:nvPr/>
+        </p:nvSpPr>
+        <p:spPr>
+          <a:xfrm>
+            <a:off x="4715933" y="1649346"/>
+            <a:ext cx="2286000" cy="646331"/>
+          </a:xfrm>
+          <a:prstGeom prst="rect">
+            <a:avLst/>
+          </a:prstGeom>
+          <a:noFill/>
+        </p:spPr>
+        <p:txBody>
+          <a:bodyPr wrap="square" rtlCol="0">
+            <a:spAutoFit/>
+          </a:bodyPr>
+          <a:lstStyle/>
+          <a:p>
+            <a:pPr algn="ctr"/>
+            <a:r>
+              <a:rPr lang="en-US" dirty="0"/>
+              <a:t>Creates a file that can be run</a:t>
+            </a:r>
+          </a:p>
+        </p:txBody>
+      </p:sp>
+      <p:sp>
+        <p:nvSpPr>
+          <p:cNvPr id="11" name="TextBox 10">
+            <a:extLst>
+              <a:ext uri="{FF2B5EF4-FFF2-40B4-BE49-F238E27FC236}">
+                <a16:creationId xmlns:a16="http://schemas.microsoft.com/office/drawing/2014/main" id="{B7C1CB46-99B8-4B7E-B4B6-234095E8483F}"/>
+              </a:ext>
+            </a:extLst>
+          </p:cNvPr>
+          <p:cNvSpPr txBox="1"/>
+          <p:nvPr/>
+        </p:nvSpPr>
+        <p:spPr>
+          <a:xfrm>
+            <a:off x="8314266" y="1673093"/>
+            <a:ext cx="2286000" cy="646331"/>
+          </a:xfrm>
+          <a:prstGeom prst="rect">
+            <a:avLst/>
+          </a:prstGeom>
+          <a:noFill/>
+        </p:spPr>
+        <p:txBody>
+          <a:bodyPr wrap="square" rtlCol="0">
+            <a:spAutoFit/>
+          </a:bodyPr>
+          <a:lstStyle/>
+          <a:p>
+            <a:pPr algn="ctr"/>
+            <a:r>
+              <a:rPr lang="en-US" dirty="0"/>
+              <a:t>Place for reusable code</a:t>
+            </a:r>
+          </a:p>
+        </p:txBody>
+      </p:sp>
+    </p:spTree>
+    <p:extLst>
+      <p:ext uri="{BB962C8B-B14F-4D97-AF65-F5344CB8AC3E}">
+        <p14:creationId xmlns:p14="http://schemas.microsoft.com/office/powerpoint/2010/main" val="3915193246"/>
       </p:ext>
     </p:extLst>
   </p:cSld>

</xml_diff>

<commit_message>
Add func anatomy slide
</commit_message>
<xml_diff>
--- a/Hello World/Go Packages.pptx
+++ b/Hello World/Go Packages.pptx
@@ -9,6 +9,7 @@
     <p:sldId id="257" r:id="rId3"/>
     <p:sldId id="258" r:id="rId4"/>
     <p:sldId id="259" r:id="rId5"/>
+    <p:sldId id="260" r:id="rId6"/>
   </p:sldIdLst>
   <p:sldSz cx="12192000" cy="6858000"/>
   <p:notesSz cx="6858000" cy="9144000"/>
@@ -107,6 +108,11 @@
       </a:defRPr>
     </a:lvl9pPr>
   </p:defaultTextStyle>
+  <p:extLst>
+    <p:ext uri="{EFAFB233-063F-42B5-8137-9DF3F51BA10A}">
+      <p15:sldGuideLst xmlns:p15="http://schemas.microsoft.com/office/powerpoint/2012/main"/>
+    </p:ext>
+  </p:extLst>
 </p:presentation>
 </file>
 
@@ -4466,20 +4472,677 @@
           <a:p>
             <a:r>
               <a:rPr lang="en-US" dirty="0"/>
-              <a:t>Every executable package must have a </a:t>
-            </a:r>
-            <a:r>
-              <a:rPr lang="en-US"/>
-              <a:t>main function.</a:t>
-            </a:r>
-            <a:endParaRPr lang="en-US" dirty="0"/>
-          </a:p>
-        </p:txBody>
-      </p:sp>
+              <a:t>Every executable package must have a main function.</a:t>
+            </a:r>
+          </a:p>
+        </p:txBody>
+      </p:sp>
+      <p:pic>
+        <p:nvPicPr>
+          <p:cNvPr id="5" name="Picture 4">
+            <a:extLst>
+              <a:ext uri="{FF2B5EF4-FFF2-40B4-BE49-F238E27FC236}">
+                <a16:creationId xmlns:a16="http://schemas.microsoft.com/office/drawing/2014/main" id="{D928CC9C-0A19-4D83-89C3-C1629B86EFA3}"/>
+              </a:ext>
+            </a:extLst>
+          </p:cNvPr>
+          <p:cNvPicPr>
+            <a:picLocks noChangeAspect="1"/>
+          </p:cNvPicPr>
+          <p:nvPr/>
+        </p:nvPicPr>
+        <p:blipFill>
+          <a:blip r:embed="rId2"/>
+          <a:stretch>
+            <a:fillRect/>
+          </a:stretch>
+        </p:blipFill>
+        <p:spPr>
+          <a:xfrm>
+            <a:off x="1007532" y="4495800"/>
+            <a:ext cx="2286000" cy="2286000"/>
+          </a:xfrm>
+          <a:prstGeom prst="rect">
+            <a:avLst/>
+          </a:prstGeom>
+        </p:spPr>
+      </p:pic>
     </p:spTree>
     <p:extLst>
       <p:ext uri="{BB962C8B-B14F-4D97-AF65-F5344CB8AC3E}">
         <p14:creationId xmlns:p14="http://schemas.microsoft.com/office/powerpoint/2010/main" val="2190070203"/>
+      </p:ext>
+    </p:extLst>
+  </p:cSld>
+  <p:clrMapOvr>
+    <a:masterClrMapping/>
+  </p:clrMapOvr>
+</p:sld>
+</file>
+
+<file path=ppt/slides/slide5.xml><?xml version="1.0" encoding="utf-8"?>
+<p:sld xmlns:a="http://schemas.openxmlformats.org/drawingml/2006/main" xmlns:r="http://schemas.openxmlformats.org/officeDocument/2006/relationships" xmlns:p="http://schemas.openxmlformats.org/presentationml/2006/main">
+  <p:cSld>
+    <p:spTree>
+      <p:nvGrpSpPr>
+        <p:cNvPr id="1" name=""/>
+        <p:cNvGrpSpPr/>
+        <p:nvPr/>
+      </p:nvGrpSpPr>
+      <p:grpSpPr>
+        <a:xfrm>
+          <a:off x="0" y="0"/>
+          <a:ext cx="0" cy="0"/>
+          <a:chOff x="0" y="0"/>
+          <a:chExt cx="0" cy="0"/>
+        </a:xfrm>
+      </p:grpSpPr>
+      <p:sp>
+        <p:nvSpPr>
+          <p:cNvPr id="10" name="Rectangle 9">
+            <a:extLst>
+              <a:ext uri="{FF2B5EF4-FFF2-40B4-BE49-F238E27FC236}">
+                <a16:creationId xmlns:a16="http://schemas.microsoft.com/office/drawing/2014/main" id="{F0996B0C-78AD-410B-A1C1-9D6F1099F94B}"/>
+              </a:ext>
+            </a:extLst>
+          </p:cNvPr>
+          <p:cNvSpPr/>
+          <p:nvPr/>
+        </p:nvSpPr>
+        <p:spPr>
+          <a:xfrm>
+            <a:off x="7840134" y="1397000"/>
+            <a:ext cx="347132" cy="431800"/>
+          </a:xfrm>
+          <a:prstGeom prst="rect">
+            <a:avLst/>
+          </a:prstGeom>
+        </p:spPr>
+        <p:style>
+          <a:lnRef idx="1">
+            <a:schemeClr val="accent2"/>
+          </a:lnRef>
+          <a:fillRef idx="2">
+            <a:schemeClr val="accent2"/>
+          </a:fillRef>
+          <a:effectRef idx="1">
+            <a:schemeClr val="accent2"/>
+          </a:effectRef>
+          <a:fontRef idx="minor">
+            <a:schemeClr val="dk1"/>
+          </a:fontRef>
+        </p:style>
+        <p:txBody>
+          <a:bodyPr rtlCol="0" anchor="ctr"/>
+          <a:lstStyle/>
+          <a:p>
+            <a:pPr algn="ctr"/>
+            <a:endParaRPr lang="en-US"/>
+          </a:p>
+        </p:txBody>
+      </p:sp>
+      <p:sp>
+        <p:nvSpPr>
+          <p:cNvPr id="9" name="Rectangle 8">
+            <a:extLst>
+              <a:ext uri="{FF2B5EF4-FFF2-40B4-BE49-F238E27FC236}">
+                <a16:creationId xmlns:a16="http://schemas.microsoft.com/office/drawing/2014/main" id="{75370193-D9A7-4563-8A84-BB67FD01643F}"/>
+              </a:ext>
+            </a:extLst>
+          </p:cNvPr>
+          <p:cNvSpPr/>
+          <p:nvPr/>
+        </p:nvSpPr>
+        <p:spPr>
+          <a:xfrm>
+            <a:off x="6968067" y="1397000"/>
+            <a:ext cx="872067" cy="431800"/>
+          </a:xfrm>
+          <a:prstGeom prst="rect">
+            <a:avLst/>
+          </a:prstGeom>
+        </p:spPr>
+        <p:style>
+          <a:lnRef idx="1">
+            <a:schemeClr val="accent3"/>
+          </a:lnRef>
+          <a:fillRef idx="2">
+            <a:schemeClr val="accent3"/>
+          </a:fillRef>
+          <a:effectRef idx="1">
+            <a:schemeClr val="accent3"/>
+          </a:effectRef>
+          <a:fontRef idx="minor">
+            <a:schemeClr val="dk1"/>
+          </a:fontRef>
+        </p:style>
+        <p:txBody>
+          <a:bodyPr rtlCol="0" anchor="ctr"/>
+          <a:lstStyle/>
+          <a:p>
+            <a:pPr algn="ctr"/>
+            <a:endParaRPr lang="en-US"/>
+          </a:p>
+        </p:txBody>
+      </p:sp>
+      <p:sp>
+        <p:nvSpPr>
+          <p:cNvPr id="8" name="Rectangle 7">
+            <a:extLst>
+              <a:ext uri="{FF2B5EF4-FFF2-40B4-BE49-F238E27FC236}">
+                <a16:creationId xmlns:a16="http://schemas.microsoft.com/office/drawing/2014/main" id="{2471F5E8-9DC0-4232-B282-49EDFC3C6DF2}"/>
+              </a:ext>
+            </a:extLst>
+          </p:cNvPr>
+          <p:cNvSpPr/>
+          <p:nvPr/>
+        </p:nvSpPr>
+        <p:spPr>
+          <a:xfrm>
+            <a:off x="6096000" y="1397000"/>
+            <a:ext cx="872067" cy="431800"/>
+          </a:xfrm>
+          <a:prstGeom prst="rect">
+            <a:avLst/>
+          </a:prstGeom>
+        </p:spPr>
+        <p:style>
+          <a:lnRef idx="1">
+            <a:schemeClr val="accent1"/>
+          </a:lnRef>
+          <a:fillRef idx="2">
+            <a:schemeClr val="accent1"/>
+          </a:fillRef>
+          <a:effectRef idx="1">
+            <a:schemeClr val="accent1"/>
+          </a:effectRef>
+          <a:fontRef idx="minor">
+            <a:schemeClr val="dk1"/>
+          </a:fontRef>
+        </p:style>
+        <p:txBody>
+          <a:bodyPr rtlCol="0" anchor="ctr"/>
+          <a:lstStyle/>
+          <a:p>
+            <a:pPr algn="ctr"/>
+            <a:endParaRPr lang="en-US"/>
+          </a:p>
+        </p:txBody>
+      </p:sp>
+      <p:sp>
+        <p:nvSpPr>
+          <p:cNvPr id="2" name="Title 1">
+            <a:extLst>
+              <a:ext uri="{FF2B5EF4-FFF2-40B4-BE49-F238E27FC236}">
+                <a16:creationId xmlns:a16="http://schemas.microsoft.com/office/drawing/2014/main" id="{DFF0FB8A-23F2-4E0A-B8EE-18E42905F965}"/>
+              </a:ext>
+            </a:extLst>
+          </p:cNvPr>
+          <p:cNvSpPr>
+            <a:spLocks noGrp="1"/>
+          </p:cNvSpPr>
+          <p:nvPr>
+            <p:ph type="title"/>
+          </p:nvPr>
+        </p:nvSpPr>
+        <p:spPr/>
+        <p:txBody>
+          <a:bodyPr/>
+          <a:lstStyle/>
+          <a:p>
+            <a:r>
+              <a:rPr lang="en-US" dirty="0"/>
+              <a:t>What is func ?</a:t>
+            </a:r>
+          </a:p>
+        </p:txBody>
+      </p:sp>
+      <p:pic>
+        <p:nvPicPr>
+          <p:cNvPr id="5" name="Content Placeholder 4">
+            <a:extLst>
+              <a:ext uri="{FF2B5EF4-FFF2-40B4-BE49-F238E27FC236}">
+                <a16:creationId xmlns:a16="http://schemas.microsoft.com/office/drawing/2014/main" id="{4DBA2B1A-3B23-4DBB-9F93-ECDE20804234}"/>
+              </a:ext>
+            </a:extLst>
+          </p:cNvPr>
+          <p:cNvPicPr>
+            <a:picLocks noGrp="1" noChangeAspect="1"/>
+          </p:cNvPicPr>
+          <p:nvPr>
+            <p:ph idx="1"/>
+          </p:nvPr>
+        </p:nvPicPr>
+        <p:blipFill>
+          <a:blip r:embed="rId2"/>
+          <a:stretch>
+            <a:fillRect/>
+          </a:stretch>
+        </p:blipFill>
+        <p:spPr>
+          <a:xfrm>
+            <a:off x="583660" y="3686703"/>
+            <a:ext cx="2286000" cy="2286000"/>
+          </a:xfrm>
+        </p:spPr>
+      </p:pic>
+      <p:sp>
+        <p:nvSpPr>
+          <p:cNvPr id="6" name="TextBox 5">
+            <a:extLst>
+              <a:ext uri="{FF2B5EF4-FFF2-40B4-BE49-F238E27FC236}">
+                <a16:creationId xmlns:a16="http://schemas.microsoft.com/office/drawing/2014/main" id="{35AC4197-90DA-424C-8D44-E9DDCEB04E24}"/>
+              </a:ext>
+            </a:extLst>
+          </p:cNvPr>
+          <p:cNvSpPr txBox="1"/>
+          <p:nvPr/>
+        </p:nvSpPr>
+        <p:spPr>
+          <a:xfrm>
+            <a:off x="3547533" y="762000"/>
+            <a:ext cx="7399867" cy="2123658"/>
+          </a:xfrm>
+          <a:prstGeom prst="rect">
+            <a:avLst/>
+          </a:prstGeom>
+          <a:noFill/>
+        </p:spPr>
+        <p:txBody>
+          <a:bodyPr wrap="square" rtlCol="0">
+            <a:spAutoFit/>
+          </a:bodyPr>
+          <a:lstStyle/>
+          <a:p>
+            <a:pPr algn="ctr"/>
+            <a:endParaRPr lang="en-US" dirty="0"/>
+          </a:p>
+          <a:p>
+            <a:pPr algn="ctr"/>
+            <a:endParaRPr lang="en-US" dirty="0"/>
+          </a:p>
+          <a:p>
+            <a:pPr algn="ctr"/>
+            <a:r>
+              <a:rPr lang="en-US" sz="3200" b="1" dirty="0"/>
+              <a:t>func main() {</a:t>
+            </a:r>
+          </a:p>
+          <a:p>
+            <a:pPr algn="ctr"/>
+            <a:endParaRPr lang="en-US" sz="3200" b="1" dirty="0"/>
+          </a:p>
+          <a:p>
+            <a:pPr algn="ctr"/>
+            <a:r>
+              <a:rPr lang="en-US" sz="3200" b="1" dirty="0"/>
+              <a:t>}</a:t>
+            </a:r>
+          </a:p>
+        </p:txBody>
+      </p:sp>
+      <p:sp>
+        <p:nvSpPr>
+          <p:cNvPr id="7" name="Rectangle 6">
+            <a:extLst>
+              <a:ext uri="{FF2B5EF4-FFF2-40B4-BE49-F238E27FC236}">
+                <a16:creationId xmlns:a16="http://schemas.microsoft.com/office/drawing/2014/main" id="{114BEDC5-CC5E-4018-810D-AF659CF68868}"/>
+              </a:ext>
+            </a:extLst>
+          </p:cNvPr>
+          <p:cNvSpPr/>
+          <p:nvPr/>
+        </p:nvSpPr>
+        <p:spPr>
+          <a:xfrm>
+            <a:off x="6197600" y="1828800"/>
+            <a:ext cx="2921000" cy="516467"/>
+          </a:xfrm>
+          <a:prstGeom prst="rect">
+            <a:avLst/>
+          </a:prstGeom>
+        </p:spPr>
+        <p:style>
+          <a:lnRef idx="1">
+            <a:schemeClr val="accent6"/>
+          </a:lnRef>
+          <a:fillRef idx="2">
+            <a:schemeClr val="accent6"/>
+          </a:fillRef>
+          <a:effectRef idx="1">
+            <a:schemeClr val="accent6"/>
+          </a:effectRef>
+          <a:fontRef idx="minor">
+            <a:schemeClr val="dk1"/>
+          </a:fontRef>
+        </p:style>
+        <p:txBody>
+          <a:bodyPr rot="0" spcFirstLastPara="0" vertOverflow="overflow" horzOverflow="overflow" vert="horz" wrap="square" lIns="91440" tIns="45720" rIns="91440" bIns="45720" numCol="1" spcCol="0" rtlCol="0" fromWordArt="0" anchor="ctr" anchorCtr="0" forceAA="0" compatLnSpc="1">
+            <a:prstTxWarp prst="textNoShape">
+              <a:avLst/>
+            </a:prstTxWarp>
+            <a:noAutofit/>
+          </a:bodyPr>
+          <a:lstStyle/>
+          <a:p>
+            <a:pPr algn="ctr"/>
+            <a:endParaRPr lang="en-US" b="1">
+              <a:ln w="22225">
+                <a:solidFill>
+                  <a:schemeClr val="accent2"/>
+                </a:solidFill>
+                <a:prstDash val="solid"/>
+              </a:ln>
+              <a:solidFill>
+                <a:schemeClr val="accent2">
+                  <a:lumMod val="40000"/>
+                  <a:lumOff val="60000"/>
+                </a:schemeClr>
+              </a:solidFill>
+            </a:endParaRPr>
+          </a:p>
+        </p:txBody>
+      </p:sp>
+      <p:cxnSp>
+        <p:nvCxnSpPr>
+          <p:cNvPr id="14" name="Connector: Elbow 13">
+            <a:extLst>
+              <a:ext uri="{FF2B5EF4-FFF2-40B4-BE49-F238E27FC236}">
+                <a16:creationId xmlns:a16="http://schemas.microsoft.com/office/drawing/2014/main" id="{D137D571-A720-4942-8386-01F3536D6560}"/>
+              </a:ext>
+            </a:extLst>
+          </p:cNvPr>
+          <p:cNvCxnSpPr/>
+          <p:nvPr/>
+        </p:nvCxnSpPr>
+        <p:spPr>
+          <a:xfrm>
+            <a:off x="5181600" y="1286933"/>
+            <a:ext cx="846667" cy="304800"/>
+          </a:xfrm>
+          <a:prstGeom prst="bentConnector3">
+            <a:avLst/>
+          </a:prstGeom>
+          <a:ln>
+            <a:tailEnd type="triangle"/>
+          </a:ln>
+        </p:spPr>
+        <p:style>
+          <a:lnRef idx="1">
+            <a:schemeClr val="accent1"/>
+          </a:lnRef>
+          <a:fillRef idx="0">
+            <a:schemeClr val="accent1"/>
+          </a:fillRef>
+          <a:effectRef idx="0">
+            <a:schemeClr val="accent1"/>
+          </a:effectRef>
+          <a:fontRef idx="minor">
+            <a:schemeClr val="tx1"/>
+          </a:fontRef>
+        </p:style>
+      </p:cxnSp>
+      <p:cxnSp>
+        <p:nvCxnSpPr>
+          <p:cNvPr id="16" name="Connector: Elbow 15">
+            <a:extLst>
+              <a:ext uri="{FF2B5EF4-FFF2-40B4-BE49-F238E27FC236}">
+                <a16:creationId xmlns:a16="http://schemas.microsoft.com/office/drawing/2014/main" id="{2C006EF6-21C5-45F4-B1B9-DBF13174ED32}"/>
+              </a:ext>
+            </a:extLst>
+          </p:cNvPr>
+          <p:cNvCxnSpPr/>
+          <p:nvPr/>
+        </p:nvCxnSpPr>
+        <p:spPr>
+          <a:xfrm rot="5400000">
+            <a:off x="7255934" y="914400"/>
+            <a:ext cx="635000" cy="330201"/>
+          </a:xfrm>
+          <a:prstGeom prst="bentConnector3">
+            <a:avLst/>
+          </a:prstGeom>
+          <a:ln>
+            <a:tailEnd type="triangle"/>
+          </a:ln>
+        </p:spPr>
+        <p:style>
+          <a:lnRef idx="1">
+            <a:schemeClr val="accent3"/>
+          </a:lnRef>
+          <a:fillRef idx="0">
+            <a:schemeClr val="accent3"/>
+          </a:fillRef>
+          <a:effectRef idx="0">
+            <a:schemeClr val="accent3"/>
+          </a:effectRef>
+          <a:fontRef idx="minor">
+            <a:schemeClr val="tx1"/>
+          </a:fontRef>
+        </p:style>
+      </p:cxnSp>
+      <p:cxnSp>
+        <p:nvCxnSpPr>
+          <p:cNvPr id="22" name="Connector: Elbow 21">
+            <a:extLst>
+              <a:ext uri="{FF2B5EF4-FFF2-40B4-BE49-F238E27FC236}">
+                <a16:creationId xmlns:a16="http://schemas.microsoft.com/office/drawing/2014/main" id="{6A26A6D8-8A9C-431F-8E99-2B671162D246}"/>
+              </a:ext>
+            </a:extLst>
+          </p:cNvPr>
+          <p:cNvCxnSpPr/>
+          <p:nvPr/>
+        </p:nvCxnSpPr>
+        <p:spPr>
+          <a:xfrm rot="5400000">
+            <a:off x="7907868" y="795865"/>
+            <a:ext cx="635000" cy="567269"/>
+          </a:xfrm>
+          <a:prstGeom prst="bentConnector3">
+            <a:avLst/>
+          </a:prstGeom>
+          <a:ln>
+            <a:tailEnd type="triangle"/>
+          </a:ln>
+        </p:spPr>
+        <p:style>
+          <a:lnRef idx="1">
+            <a:schemeClr val="accent2"/>
+          </a:lnRef>
+          <a:fillRef idx="0">
+            <a:schemeClr val="accent2"/>
+          </a:fillRef>
+          <a:effectRef idx="0">
+            <a:schemeClr val="accent2"/>
+          </a:effectRef>
+          <a:fontRef idx="minor">
+            <a:schemeClr val="tx1"/>
+          </a:fontRef>
+        </p:style>
+      </p:cxnSp>
+      <p:cxnSp>
+        <p:nvCxnSpPr>
+          <p:cNvPr id="26" name="Straight Arrow Connector 25">
+            <a:extLst>
+              <a:ext uri="{FF2B5EF4-FFF2-40B4-BE49-F238E27FC236}">
+                <a16:creationId xmlns:a16="http://schemas.microsoft.com/office/drawing/2014/main" id="{F5F5BBBD-BF0F-4C3D-961D-4BBE7D326131}"/>
+              </a:ext>
+            </a:extLst>
+          </p:cNvPr>
+          <p:cNvCxnSpPr/>
+          <p:nvPr/>
+        </p:nvCxnSpPr>
+        <p:spPr>
+          <a:xfrm flipH="1">
+            <a:off x="9118600" y="2074333"/>
+            <a:ext cx="635000" cy="0"/>
+          </a:xfrm>
+          <a:prstGeom prst="straightConnector1">
+            <a:avLst/>
+          </a:prstGeom>
+          <a:ln>
+            <a:tailEnd type="triangle"/>
+          </a:ln>
+        </p:spPr>
+        <p:style>
+          <a:lnRef idx="1">
+            <a:schemeClr val="accent6"/>
+          </a:lnRef>
+          <a:fillRef idx="0">
+            <a:schemeClr val="accent6"/>
+          </a:fillRef>
+          <a:effectRef idx="0">
+            <a:schemeClr val="accent6"/>
+          </a:effectRef>
+          <a:fontRef idx="minor">
+            <a:schemeClr val="tx1"/>
+          </a:fontRef>
+        </p:style>
+      </p:cxnSp>
+      <p:sp>
+        <p:nvSpPr>
+          <p:cNvPr id="27" name="TextBox 26">
+            <a:extLst>
+              <a:ext uri="{FF2B5EF4-FFF2-40B4-BE49-F238E27FC236}">
+                <a16:creationId xmlns:a16="http://schemas.microsoft.com/office/drawing/2014/main" id="{EA6A5A54-6795-45B3-86A2-3DB13D99E2D8}"/>
+              </a:ext>
+            </a:extLst>
+          </p:cNvPr>
+          <p:cNvSpPr txBox="1"/>
+          <p:nvPr/>
+        </p:nvSpPr>
+        <p:spPr>
+          <a:xfrm>
+            <a:off x="3970868" y="1024467"/>
+            <a:ext cx="1210732" cy="738664"/>
+          </a:xfrm>
+          <a:prstGeom prst="rect">
+            <a:avLst/>
+          </a:prstGeom>
+          <a:noFill/>
+        </p:spPr>
+        <p:txBody>
+          <a:bodyPr wrap="square" rtlCol="0">
+            <a:spAutoFit/>
+          </a:bodyPr>
+          <a:lstStyle/>
+          <a:p>
+            <a:r>
+              <a:rPr lang="en-US" sz="1400" dirty="0"/>
+              <a:t>Tells go we’re declaring a function</a:t>
+            </a:r>
+          </a:p>
+        </p:txBody>
+      </p:sp>
+      <p:sp>
+        <p:nvSpPr>
+          <p:cNvPr id="28" name="TextBox 27">
+            <a:extLst>
+              <a:ext uri="{FF2B5EF4-FFF2-40B4-BE49-F238E27FC236}">
+                <a16:creationId xmlns:a16="http://schemas.microsoft.com/office/drawing/2014/main" id="{43788D50-4A50-4816-9811-219FC2202BA2}"/>
+              </a:ext>
+            </a:extLst>
+          </p:cNvPr>
+          <p:cNvSpPr txBox="1"/>
+          <p:nvPr/>
+        </p:nvSpPr>
+        <p:spPr>
+          <a:xfrm>
+            <a:off x="7234768" y="192212"/>
+            <a:ext cx="859365" cy="523220"/>
+          </a:xfrm>
+          <a:prstGeom prst="rect">
+            <a:avLst/>
+          </a:prstGeom>
+          <a:noFill/>
+        </p:spPr>
+        <p:txBody>
+          <a:bodyPr wrap="square" rtlCol="0">
+            <a:spAutoFit/>
+          </a:bodyPr>
+          <a:lstStyle/>
+          <a:p>
+            <a:r>
+              <a:rPr lang="en-US" sz="1400" dirty="0"/>
+              <a:t>Function name</a:t>
+            </a:r>
+          </a:p>
+        </p:txBody>
+      </p:sp>
+      <p:sp>
+        <p:nvSpPr>
+          <p:cNvPr id="29" name="TextBox 28">
+            <a:extLst>
+              <a:ext uri="{FF2B5EF4-FFF2-40B4-BE49-F238E27FC236}">
+                <a16:creationId xmlns:a16="http://schemas.microsoft.com/office/drawing/2014/main" id="{B4E4C7F8-9D2E-494E-8C5F-440B2DFB649B}"/>
+              </a:ext>
+            </a:extLst>
+          </p:cNvPr>
+          <p:cNvSpPr txBox="1"/>
+          <p:nvPr/>
+        </p:nvSpPr>
+        <p:spPr>
+          <a:xfrm>
+            <a:off x="8079320" y="183745"/>
+            <a:ext cx="963080" cy="523220"/>
+          </a:xfrm>
+          <a:prstGeom prst="rect">
+            <a:avLst/>
+          </a:prstGeom>
+          <a:noFill/>
+        </p:spPr>
+        <p:txBody>
+          <a:bodyPr wrap="square" rtlCol="0">
+            <a:spAutoFit/>
+          </a:bodyPr>
+          <a:lstStyle/>
+          <a:p>
+            <a:r>
+              <a:rPr lang="en-US" sz="1400" dirty="0"/>
+              <a:t>Argument list</a:t>
+            </a:r>
+          </a:p>
+        </p:txBody>
+      </p:sp>
+      <p:sp>
+        <p:nvSpPr>
+          <p:cNvPr id="30" name="TextBox 29">
+            <a:extLst>
+              <a:ext uri="{FF2B5EF4-FFF2-40B4-BE49-F238E27FC236}">
+                <a16:creationId xmlns:a16="http://schemas.microsoft.com/office/drawing/2014/main" id="{F7F7DF3D-36A0-4ADF-B5C1-5D8BD55DCDCF}"/>
+              </a:ext>
+            </a:extLst>
+          </p:cNvPr>
+          <p:cNvSpPr txBox="1"/>
+          <p:nvPr/>
+        </p:nvSpPr>
+        <p:spPr>
+          <a:xfrm>
+            <a:off x="9753600" y="1591733"/>
+            <a:ext cx="1540932" cy="1169551"/>
+          </a:xfrm>
+          <a:prstGeom prst="rect">
+            <a:avLst/>
+          </a:prstGeom>
+          <a:noFill/>
+        </p:spPr>
+        <p:txBody>
+          <a:bodyPr wrap="square" rtlCol="0">
+            <a:spAutoFit/>
+          </a:bodyPr>
+          <a:lstStyle/>
+          <a:p>
+            <a:r>
+              <a:rPr lang="en-US" sz="1400" dirty="0"/>
+              <a:t>Function body, code to be run/executed when THIS function is called</a:t>
+            </a:r>
+          </a:p>
+        </p:txBody>
+      </p:sp>
+    </p:spTree>
+    <p:extLst>
+      <p:ext uri="{BB962C8B-B14F-4D97-AF65-F5344CB8AC3E}">
+        <p14:creationId xmlns:p14="http://schemas.microsoft.com/office/powerpoint/2010/main" val="634145651"/>
       </p:ext>
     </p:extLst>
   </p:cSld>

</xml_diff>